<commit_message>
Promoted Snowflake (08) restructure, updated documentation, Databricks/Snowflake portfolio sections, and repo numbering alignment
</commit_message>
<xml_diff>
--- a/docs/portfolio-overview/Screenshots_WIP.pptx
+++ b/docs/portfolio-overview/Screenshots_WIP.pptx
@@ -19,6 +19,9 @@
     <p:sldId id="267" r:id="rId13"/>
     <p:sldId id="268" r:id="rId14"/>
     <p:sldId id="269" r:id="rId15"/>
+    <p:sldId id="270" r:id="rId16"/>
+    <p:sldId id="271" r:id="rId17"/>
+    <p:sldId id="272" r:id="rId18"/>
   </p:sldIdLst>
   <p:sldSz cx="12192000" cy="6858000"/>
   <p:notesSz cx="6858000" cy="9144000"/>
@@ -117,6 +120,11 @@
       </a:defRPr>
     </a:lvl9pPr>
   </p:defaultTextStyle>
+  <p:extLst>
+    <p:ext uri="{EFAFB233-063F-42B5-8137-9DF3F51BA10A}">
+      <p15:sldGuideLst xmlns:p15="http://schemas.microsoft.com/office/powerpoint/2012/main"/>
+    </p:ext>
+  </p:extLst>
 </p:presentation>
 </file>
 
@@ -267,7 +275,7 @@
           <a:p>
             <a:fld id="{B5B93D9F-D860-48E0-8534-1E68250CD742}" type="datetimeFigureOut">
               <a:rPr lang="en-US" smtClean="0"/>
-              <a:t>2/19/2026</a:t>
+              <a:t>2/28/2026</a:t>
             </a:fld>
             <a:endParaRPr lang="en-US"/>
           </a:p>
@@ -465,7 +473,7 @@
           <a:p>
             <a:fld id="{B5B93D9F-D860-48E0-8534-1E68250CD742}" type="datetimeFigureOut">
               <a:rPr lang="en-US" smtClean="0"/>
-              <a:t>2/19/2026</a:t>
+              <a:t>2/28/2026</a:t>
             </a:fld>
             <a:endParaRPr lang="en-US"/>
           </a:p>
@@ -673,7 +681,7 @@
           <a:p>
             <a:fld id="{B5B93D9F-D860-48E0-8534-1E68250CD742}" type="datetimeFigureOut">
               <a:rPr lang="en-US" smtClean="0"/>
-              <a:t>2/19/2026</a:t>
+              <a:t>2/28/2026</a:t>
             </a:fld>
             <a:endParaRPr lang="en-US"/>
           </a:p>
@@ -871,7 +879,7 @@
           <a:p>
             <a:fld id="{B5B93D9F-D860-48E0-8534-1E68250CD742}" type="datetimeFigureOut">
               <a:rPr lang="en-US" smtClean="0"/>
-              <a:t>2/19/2026</a:t>
+              <a:t>2/28/2026</a:t>
             </a:fld>
             <a:endParaRPr lang="en-US"/>
           </a:p>
@@ -1146,7 +1154,7 @@
           <a:p>
             <a:fld id="{B5B93D9F-D860-48E0-8534-1E68250CD742}" type="datetimeFigureOut">
               <a:rPr lang="en-US" smtClean="0"/>
-              <a:t>2/19/2026</a:t>
+              <a:t>2/28/2026</a:t>
             </a:fld>
             <a:endParaRPr lang="en-US"/>
           </a:p>
@@ -1411,7 +1419,7 @@
           <a:p>
             <a:fld id="{B5B93D9F-D860-48E0-8534-1E68250CD742}" type="datetimeFigureOut">
               <a:rPr lang="en-US" smtClean="0"/>
-              <a:t>2/19/2026</a:t>
+              <a:t>2/28/2026</a:t>
             </a:fld>
             <a:endParaRPr lang="en-US"/>
           </a:p>
@@ -1823,7 +1831,7 @@
           <a:p>
             <a:fld id="{B5B93D9F-D860-48E0-8534-1E68250CD742}" type="datetimeFigureOut">
               <a:rPr lang="en-US" smtClean="0"/>
-              <a:t>2/19/2026</a:t>
+              <a:t>2/28/2026</a:t>
             </a:fld>
             <a:endParaRPr lang="en-US"/>
           </a:p>
@@ -1964,7 +1972,7 @@
           <a:p>
             <a:fld id="{B5B93D9F-D860-48E0-8534-1E68250CD742}" type="datetimeFigureOut">
               <a:rPr lang="en-US" smtClean="0"/>
-              <a:t>2/19/2026</a:t>
+              <a:t>2/28/2026</a:t>
             </a:fld>
             <a:endParaRPr lang="en-US"/>
           </a:p>
@@ -2077,7 +2085,7 @@
           <a:p>
             <a:fld id="{B5B93D9F-D860-48E0-8534-1E68250CD742}" type="datetimeFigureOut">
               <a:rPr lang="en-US" smtClean="0"/>
-              <a:t>2/19/2026</a:t>
+              <a:t>2/28/2026</a:t>
             </a:fld>
             <a:endParaRPr lang="en-US"/>
           </a:p>
@@ -2388,7 +2396,7 @@
           <a:p>
             <a:fld id="{B5B93D9F-D860-48E0-8534-1E68250CD742}" type="datetimeFigureOut">
               <a:rPr lang="en-US" smtClean="0"/>
-              <a:t>2/19/2026</a:t>
+              <a:t>2/28/2026</a:t>
             </a:fld>
             <a:endParaRPr lang="en-US"/>
           </a:p>
@@ -2676,7 +2684,7 @@
           <a:p>
             <a:fld id="{B5B93D9F-D860-48E0-8534-1E68250CD742}" type="datetimeFigureOut">
               <a:rPr lang="en-US" smtClean="0"/>
-              <a:t>2/19/2026</a:t>
+              <a:t>2/28/2026</a:t>
             </a:fld>
             <a:endParaRPr lang="en-US"/>
           </a:p>
@@ -2917,7 +2925,7 @@
           <a:p>
             <a:fld id="{B5B93D9F-D860-48E0-8534-1E68250CD742}" type="datetimeFigureOut">
               <a:rPr lang="en-US" smtClean="0"/>
-              <a:t>2/19/2026</a:t>
+              <a:t>2/28/2026</a:t>
             </a:fld>
             <a:endParaRPr lang="en-US"/>
           </a:p>
@@ -3858,10 +3866,178 @@
           <a:chExt cx="0" cy="0"/>
         </a:xfrm>
       </p:grpSpPr>
+      <p:pic>
+        <p:nvPicPr>
+          <p:cNvPr id="3" name="Picture 2">
+            <a:extLst>
+              <a:ext uri="{FF2B5EF4-FFF2-40B4-BE49-F238E27FC236}">
+                <a16:creationId xmlns:a16="http://schemas.microsoft.com/office/drawing/2014/main" id="{3B66CD8D-55E3-0910-5115-1E5D095B73F1}"/>
+              </a:ext>
+            </a:extLst>
+          </p:cNvPr>
+          <p:cNvPicPr>
+            <a:picLocks noChangeAspect="1"/>
+          </p:cNvPicPr>
+          <p:nvPr/>
+        </p:nvPicPr>
+        <p:blipFill>
+          <a:blip r:embed="rId2"/>
+          <a:stretch>
+            <a:fillRect/>
+          </a:stretch>
+        </p:blipFill>
+        <p:spPr>
+          <a:xfrm>
+            <a:off x="3040749" y="0"/>
+            <a:ext cx="6110501" cy="6858000"/>
+          </a:xfrm>
+          <a:prstGeom prst="rect">
+            <a:avLst/>
+          </a:prstGeom>
+        </p:spPr>
+      </p:pic>
     </p:spTree>
     <p:extLst>
       <p:ext uri="{BB962C8B-B14F-4D97-AF65-F5344CB8AC3E}">
         <p14:creationId xmlns:p14="http://schemas.microsoft.com/office/powerpoint/2010/main" val="3543903990"/>
+      </p:ext>
+    </p:extLst>
+  </p:cSld>
+  <p:clrMapOvr>
+    <a:masterClrMapping/>
+  </p:clrMapOvr>
+</p:sld>
+</file>
+
+<file path=ppt/slides/slide15.xml><?xml version="1.0" encoding="utf-8"?>
+<p:sld xmlns:a="http://schemas.openxmlformats.org/drawingml/2006/main" xmlns:r="http://schemas.openxmlformats.org/officeDocument/2006/relationships" xmlns:p="http://schemas.openxmlformats.org/presentationml/2006/main">
+  <p:cSld>
+    <p:spTree>
+      <p:nvGrpSpPr>
+        <p:cNvPr id="1" name="">
+          <a:extLst>
+            <a:ext uri="{FF2B5EF4-FFF2-40B4-BE49-F238E27FC236}">
+              <a16:creationId xmlns:a16="http://schemas.microsoft.com/office/drawing/2014/main" id="{92F266CD-9383-7F42-23C6-B8D3C719F36E}"/>
+            </a:ext>
+          </a:extLst>
+        </p:cNvPr>
+        <p:cNvGrpSpPr/>
+        <p:nvPr/>
+      </p:nvGrpSpPr>
+      <p:grpSpPr>
+        <a:xfrm>
+          <a:off x="0" y="0"/>
+          <a:ext cx="0" cy="0"/>
+          <a:chOff x="0" y="0"/>
+          <a:chExt cx="0" cy="0"/>
+        </a:xfrm>
+      </p:grpSpPr>
+      <p:pic>
+        <p:nvPicPr>
+          <p:cNvPr id="3" name="Picture 2">
+            <a:extLst>
+              <a:ext uri="{FF2B5EF4-FFF2-40B4-BE49-F238E27FC236}">
+                <a16:creationId xmlns:a16="http://schemas.microsoft.com/office/drawing/2014/main" id="{7AD71C58-3E6F-10F1-7AEF-0B3E90ECDFD3}"/>
+              </a:ext>
+            </a:extLst>
+          </p:cNvPr>
+          <p:cNvPicPr>
+            <a:picLocks noChangeAspect="1"/>
+          </p:cNvPicPr>
+          <p:nvPr/>
+        </p:nvPicPr>
+        <p:blipFill>
+          <a:blip r:embed="rId2"/>
+          <a:stretch>
+            <a:fillRect/>
+          </a:stretch>
+        </p:blipFill>
+        <p:spPr>
+          <a:xfrm>
+            <a:off x="3086582" y="0"/>
+            <a:ext cx="6018836" cy="6858000"/>
+          </a:xfrm>
+          <a:prstGeom prst="rect">
+            <a:avLst/>
+          </a:prstGeom>
+        </p:spPr>
+      </p:pic>
+    </p:spTree>
+    <p:extLst>
+      <p:ext uri="{BB962C8B-B14F-4D97-AF65-F5344CB8AC3E}">
+        <p14:creationId xmlns:p14="http://schemas.microsoft.com/office/powerpoint/2010/main" val="2225440918"/>
+      </p:ext>
+    </p:extLst>
+  </p:cSld>
+  <p:clrMapOvr>
+    <a:masterClrMapping/>
+  </p:clrMapOvr>
+</p:sld>
+</file>
+
+<file path=ppt/slides/slide16.xml><?xml version="1.0" encoding="utf-8"?>
+<p:sld xmlns:a="http://schemas.openxmlformats.org/drawingml/2006/main" xmlns:r="http://schemas.openxmlformats.org/officeDocument/2006/relationships" xmlns:p="http://schemas.openxmlformats.org/presentationml/2006/main">
+  <p:cSld>
+    <p:spTree>
+      <p:nvGrpSpPr>
+        <p:cNvPr id="1" name="">
+          <a:extLst>
+            <a:ext uri="{FF2B5EF4-FFF2-40B4-BE49-F238E27FC236}">
+              <a16:creationId xmlns:a16="http://schemas.microsoft.com/office/drawing/2014/main" id="{6ADDC4D5-355F-0519-C8B3-D384FE9586BB}"/>
+            </a:ext>
+          </a:extLst>
+        </p:cNvPr>
+        <p:cNvGrpSpPr/>
+        <p:nvPr/>
+      </p:nvGrpSpPr>
+      <p:grpSpPr>
+        <a:xfrm>
+          <a:off x="0" y="0"/>
+          <a:ext cx="0" cy="0"/>
+          <a:chOff x="0" y="0"/>
+          <a:chExt cx="0" cy="0"/>
+        </a:xfrm>
+      </p:grpSpPr>
+    </p:spTree>
+    <p:extLst>
+      <p:ext uri="{BB962C8B-B14F-4D97-AF65-F5344CB8AC3E}">
+        <p14:creationId xmlns:p14="http://schemas.microsoft.com/office/powerpoint/2010/main" val="2001885727"/>
+      </p:ext>
+    </p:extLst>
+  </p:cSld>
+  <p:clrMapOvr>
+    <a:masterClrMapping/>
+  </p:clrMapOvr>
+</p:sld>
+</file>
+
+<file path=ppt/slides/slide17.xml><?xml version="1.0" encoding="utf-8"?>
+<p:sld xmlns:a="http://schemas.openxmlformats.org/drawingml/2006/main" xmlns:r="http://schemas.openxmlformats.org/officeDocument/2006/relationships" xmlns:p="http://schemas.openxmlformats.org/presentationml/2006/main">
+  <p:cSld>
+    <p:spTree>
+      <p:nvGrpSpPr>
+        <p:cNvPr id="1" name="">
+          <a:extLst>
+            <a:ext uri="{FF2B5EF4-FFF2-40B4-BE49-F238E27FC236}">
+              <a16:creationId xmlns:a16="http://schemas.microsoft.com/office/drawing/2014/main" id="{D6C807BC-3153-78C2-58CE-B1B81AD0F2C6}"/>
+            </a:ext>
+          </a:extLst>
+        </p:cNvPr>
+        <p:cNvGrpSpPr/>
+        <p:nvPr/>
+      </p:nvGrpSpPr>
+      <p:grpSpPr>
+        <a:xfrm>
+          <a:off x="0" y="0"/>
+          <a:ext cx="0" cy="0"/>
+          <a:chOff x="0" y="0"/>
+          <a:chExt cx="0" cy="0"/>
+        </a:xfrm>
+      </p:grpSpPr>
+    </p:spTree>
+    <p:extLst>
+      <p:ext uri="{BB962C8B-B14F-4D97-AF65-F5344CB8AC3E}">
+        <p14:creationId xmlns:p14="http://schemas.microsoft.com/office/powerpoint/2010/main" val="811784611"/>
       </p:ext>
     </p:extLst>
   </p:cSld>

</xml_diff>